<commit_message>
Updated for testing purpose
</commit_message>
<xml_diff>
--- a/BeetleRobot Wire Harness.pptx
+++ b/BeetleRobot Wire Harness.pptx
@@ -1,11 +1,12 @@
 
 <file path=ppt/presentation.xml><?xml version="1.0" encoding="utf-8"?>
-<p:presentation xmlns:a="http://schemas.openxmlformats.org/drawingml/2006/main" xmlns:r="http://schemas.openxmlformats.org/officeDocument/2006/relationships" xmlns:p="http://schemas.openxmlformats.org/presentationml/2006/main" saveSubsetFonts="1">
+<p:presentation xmlns:a="http://schemas.openxmlformats.org/drawingml/2006/main" xmlns:r="http://schemas.openxmlformats.org/officeDocument/2006/relationships" xmlns:p="http://schemas.openxmlformats.org/presentationml/2006/main">
   <p:sldMasterIdLst>
     <p:sldMasterId id="2147483648" r:id="rId1"/>
   </p:sldMasterIdLst>
   <p:sldIdLst>
-    <p:sldId id="256" r:id="rId2"/>
+    <p:sldId id="256" r:id="rId3"/>
+    <p:sldId id="257" r:id="rId4"/>
   </p:sldIdLst>
   <p:sldSz cx="12192000" cy="6858000"/>
   <p:notesSz cx="6858000" cy="9144000"/>
@@ -104,11 +105,6 @@
       </a:defRPr>
     </a:lvl9pPr>
   </p:defaultTextStyle>
-  <p:extLst>
-    <p:ext uri="{EFAFB233-063F-42B5-8137-9DF3F51BA10A}">
-      <p15:sldGuideLst xmlns:p15="http://schemas.microsoft.com/office/powerpoint/2012/main"/>
-    </p:ext>
-  </p:extLst>
 </p:presentation>
 </file>
 
@@ -243,7 +239,6 @@
           <a:p>
             <a:fld id="{7BDD69B8-AA9B-4B38-8547-4FB5D336F50B}" type="datetimeFigureOut">
               <a:rPr lang="en-US" smtClean="0"/>
-              <a:t>7/21/2021</a:t>
             </a:fld>
             <a:endParaRPr lang="en-US"/>
           </a:p>
@@ -285,18 +280,12 @@
           <a:p>
             <a:fld id="{80603D6F-DFCA-4D91-A51C-800990C005DE}" type="slidenum">
               <a:rPr lang="en-US" smtClean="0"/>
-              <a:t>‹#›</a:t>
             </a:fld>
             <a:endParaRPr lang="en-US"/>
           </a:p>
         </p:txBody>
       </p:sp>
     </p:spTree>
-    <p:extLst>
-      <p:ext uri="{BB962C8B-B14F-4D97-AF65-F5344CB8AC3E}">
-        <p14:creationId xmlns:p14="http://schemas.microsoft.com/office/powerpoint/2010/main" val="3606269956"/>
-      </p:ext>
-    </p:extLst>
   </p:cSld>
   <p:clrMapOvr>
     <a:masterClrMapping/>
@@ -364,6 +353,7 @@
               <a:rPr lang="en-US" smtClean="0"/>
               <a:t>Click to edit Master text styles</a:t>
             </a:r>
+            <a:endParaRPr lang="en-US" smtClean="0"/>
           </a:p>
           <a:p>
             <a:pPr lvl="1"/>
@@ -371,6 +361,7 @@
               <a:rPr lang="en-US" smtClean="0"/>
               <a:t>Second level</a:t>
             </a:r>
+            <a:endParaRPr lang="en-US" smtClean="0"/>
           </a:p>
           <a:p>
             <a:pPr lvl="2"/>
@@ -378,6 +369,7 @@
               <a:rPr lang="en-US" smtClean="0"/>
               <a:t>Third level</a:t>
             </a:r>
+            <a:endParaRPr lang="en-US" smtClean="0"/>
           </a:p>
           <a:p>
             <a:pPr lvl="3"/>
@@ -385,6 +377,7 @@
               <a:rPr lang="en-US" smtClean="0"/>
               <a:t>Fourth level</a:t>
             </a:r>
+            <a:endParaRPr lang="en-US" smtClean="0"/>
           </a:p>
           <a:p>
             <a:pPr lvl="4"/>
@@ -413,7 +406,6 @@
           <a:p>
             <a:fld id="{7BDD69B8-AA9B-4B38-8547-4FB5D336F50B}" type="datetimeFigureOut">
               <a:rPr lang="en-US" smtClean="0"/>
-              <a:t>7/21/2021</a:t>
             </a:fld>
             <a:endParaRPr lang="en-US"/>
           </a:p>
@@ -455,18 +447,12 @@
           <a:p>
             <a:fld id="{80603D6F-DFCA-4D91-A51C-800990C005DE}" type="slidenum">
               <a:rPr lang="en-US" smtClean="0"/>
-              <a:t>‹#›</a:t>
             </a:fld>
             <a:endParaRPr lang="en-US"/>
           </a:p>
         </p:txBody>
       </p:sp>
     </p:spTree>
-    <p:extLst>
-      <p:ext uri="{BB962C8B-B14F-4D97-AF65-F5344CB8AC3E}">
-        <p14:creationId xmlns:p14="http://schemas.microsoft.com/office/powerpoint/2010/main" val="2590327931"/>
-      </p:ext>
-    </p:extLst>
   </p:cSld>
   <p:clrMapOvr>
     <a:masterClrMapping/>
@@ -544,6 +530,7 @@
               <a:rPr lang="en-US" smtClean="0"/>
               <a:t>Click to edit Master text styles</a:t>
             </a:r>
+            <a:endParaRPr lang="en-US" smtClean="0"/>
           </a:p>
           <a:p>
             <a:pPr lvl="1"/>
@@ -551,6 +538,7 @@
               <a:rPr lang="en-US" smtClean="0"/>
               <a:t>Second level</a:t>
             </a:r>
+            <a:endParaRPr lang="en-US" smtClean="0"/>
           </a:p>
           <a:p>
             <a:pPr lvl="2"/>
@@ -558,6 +546,7 @@
               <a:rPr lang="en-US" smtClean="0"/>
               <a:t>Third level</a:t>
             </a:r>
+            <a:endParaRPr lang="en-US" smtClean="0"/>
           </a:p>
           <a:p>
             <a:pPr lvl="3"/>
@@ -565,6 +554,7 @@
               <a:rPr lang="en-US" smtClean="0"/>
               <a:t>Fourth level</a:t>
             </a:r>
+            <a:endParaRPr lang="en-US" smtClean="0"/>
           </a:p>
           <a:p>
             <a:pPr lvl="4"/>
@@ -593,7 +583,6 @@
           <a:p>
             <a:fld id="{7BDD69B8-AA9B-4B38-8547-4FB5D336F50B}" type="datetimeFigureOut">
               <a:rPr lang="en-US" smtClean="0"/>
-              <a:t>7/21/2021</a:t>
             </a:fld>
             <a:endParaRPr lang="en-US"/>
           </a:p>
@@ -635,18 +624,12 @@
           <a:p>
             <a:fld id="{80603D6F-DFCA-4D91-A51C-800990C005DE}" type="slidenum">
               <a:rPr lang="en-US" smtClean="0"/>
-              <a:t>‹#›</a:t>
             </a:fld>
             <a:endParaRPr lang="en-US"/>
           </a:p>
         </p:txBody>
       </p:sp>
     </p:spTree>
-    <p:extLst>
-      <p:ext uri="{BB962C8B-B14F-4D97-AF65-F5344CB8AC3E}">
-        <p14:creationId xmlns:p14="http://schemas.microsoft.com/office/powerpoint/2010/main" val="191642790"/>
-      </p:ext>
-    </p:extLst>
   </p:cSld>
   <p:clrMapOvr>
     <a:masterClrMapping/>
@@ -714,6 +697,7 @@
               <a:rPr lang="en-US" smtClean="0"/>
               <a:t>Click to edit Master text styles</a:t>
             </a:r>
+            <a:endParaRPr lang="en-US" smtClean="0"/>
           </a:p>
           <a:p>
             <a:pPr lvl="1"/>
@@ -721,6 +705,7 @@
               <a:rPr lang="en-US" smtClean="0"/>
               <a:t>Second level</a:t>
             </a:r>
+            <a:endParaRPr lang="en-US" smtClean="0"/>
           </a:p>
           <a:p>
             <a:pPr lvl="2"/>
@@ -728,6 +713,7 @@
               <a:rPr lang="en-US" smtClean="0"/>
               <a:t>Third level</a:t>
             </a:r>
+            <a:endParaRPr lang="en-US" smtClean="0"/>
           </a:p>
           <a:p>
             <a:pPr lvl="3"/>
@@ -735,6 +721,7 @@
               <a:rPr lang="en-US" smtClean="0"/>
               <a:t>Fourth level</a:t>
             </a:r>
+            <a:endParaRPr lang="en-US" smtClean="0"/>
           </a:p>
           <a:p>
             <a:pPr lvl="4"/>
@@ -763,7 +750,6 @@
           <a:p>
             <a:fld id="{7BDD69B8-AA9B-4B38-8547-4FB5D336F50B}" type="datetimeFigureOut">
               <a:rPr lang="en-US" smtClean="0"/>
-              <a:t>7/21/2021</a:t>
             </a:fld>
             <a:endParaRPr lang="en-US"/>
           </a:p>
@@ -805,18 +791,12 @@
           <a:p>
             <a:fld id="{80603D6F-DFCA-4D91-A51C-800990C005DE}" type="slidenum">
               <a:rPr lang="en-US" smtClean="0"/>
-              <a:t>‹#›</a:t>
             </a:fld>
             <a:endParaRPr lang="en-US"/>
           </a:p>
         </p:txBody>
       </p:sp>
     </p:spTree>
-    <p:extLst>
-      <p:ext uri="{BB962C8B-B14F-4D97-AF65-F5344CB8AC3E}">
-        <p14:creationId xmlns:p14="http://schemas.microsoft.com/office/powerpoint/2010/main" val="547053374"/>
-      </p:ext>
-    </p:extLst>
   </p:cSld>
   <p:clrMapOvr>
     <a:masterClrMapping/>
@@ -989,6 +969,7 @@
               <a:rPr lang="en-US" smtClean="0"/>
               <a:t>Click to edit Master text styles</a:t>
             </a:r>
+            <a:endParaRPr lang="en-US" smtClean="0"/>
           </a:p>
         </p:txBody>
       </p:sp>
@@ -1009,7 +990,6 @@
           <a:p>
             <a:fld id="{7BDD69B8-AA9B-4B38-8547-4FB5D336F50B}" type="datetimeFigureOut">
               <a:rPr lang="en-US" smtClean="0"/>
-              <a:t>7/21/2021</a:t>
             </a:fld>
             <a:endParaRPr lang="en-US"/>
           </a:p>
@@ -1051,18 +1031,12 @@
           <a:p>
             <a:fld id="{80603D6F-DFCA-4D91-A51C-800990C005DE}" type="slidenum">
               <a:rPr lang="en-US" smtClean="0"/>
-              <a:t>‹#›</a:t>
             </a:fld>
             <a:endParaRPr lang="en-US"/>
           </a:p>
         </p:txBody>
       </p:sp>
     </p:spTree>
-    <p:extLst>
-      <p:ext uri="{BB962C8B-B14F-4D97-AF65-F5344CB8AC3E}">
-        <p14:creationId xmlns:p14="http://schemas.microsoft.com/office/powerpoint/2010/main" val="263848895"/>
-      </p:ext>
-    </p:extLst>
   </p:cSld>
   <p:clrMapOvr>
     <a:masterClrMapping/>
@@ -1135,6 +1109,7 @@
               <a:rPr lang="en-US" smtClean="0"/>
               <a:t>Click to edit Master text styles</a:t>
             </a:r>
+            <a:endParaRPr lang="en-US" smtClean="0"/>
           </a:p>
           <a:p>
             <a:pPr lvl="1"/>
@@ -1142,6 +1117,7 @@
               <a:rPr lang="en-US" smtClean="0"/>
               <a:t>Second level</a:t>
             </a:r>
+            <a:endParaRPr lang="en-US" smtClean="0"/>
           </a:p>
           <a:p>
             <a:pPr lvl="2"/>
@@ -1149,6 +1125,7 @@
               <a:rPr lang="en-US" smtClean="0"/>
               <a:t>Third level</a:t>
             </a:r>
+            <a:endParaRPr lang="en-US" smtClean="0"/>
           </a:p>
           <a:p>
             <a:pPr lvl="3"/>
@@ -1156,6 +1133,7 @@
               <a:rPr lang="en-US" smtClean="0"/>
               <a:t>Fourth level</a:t>
             </a:r>
+            <a:endParaRPr lang="en-US" smtClean="0"/>
           </a:p>
           <a:p>
             <a:pPr lvl="4"/>
@@ -1192,6 +1170,7 @@
               <a:rPr lang="en-US" smtClean="0"/>
               <a:t>Click to edit Master text styles</a:t>
             </a:r>
+            <a:endParaRPr lang="en-US" smtClean="0"/>
           </a:p>
           <a:p>
             <a:pPr lvl="1"/>
@@ -1199,6 +1178,7 @@
               <a:rPr lang="en-US" smtClean="0"/>
               <a:t>Second level</a:t>
             </a:r>
+            <a:endParaRPr lang="en-US" smtClean="0"/>
           </a:p>
           <a:p>
             <a:pPr lvl="2"/>
@@ -1206,6 +1186,7 @@
               <a:rPr lang="en-US" smtClean="0"/>
               <a:t>Third level</a:t>
             </a:r>
+            <a:endParaRPr lang="en-US" smtClean="0"/>
           </a:p>
           <a:p>
             <a:pPr lvl="3"/>
@@ -1213,6 +1194,7 @@
               <a:rPr lang="en-US" smtClean="0"/>
               <a:t>Fourth level</a:t>
             </a:r>
+            <a:endParaRPr lang="en-US" smtClean="0"/>
           </a:p>
           <a:p>
             <a:pPr lvl="4"/>
@@ -1241,7 +1223,6 @@
           <a:p>
             <a:fld id="{7BDD69B8-AA9B-4B38-8547-4FB5D336F50B}" type="datetimeFigureOut">
               <a:rPr lang="en-US" smtClean="0"/>
-              <a:t>7/21/2021</a:t>
             </a:fld>
             <a:endParaRPr lang="en-US"/>
           </a:p>
@@ -1283,18 +1264,12 @@
           <a:p>
             <a:fld id="{80603D6F-DFCA-4D91-A51C-800990C005DE}" type="slidenum">
               <a:rPr lang="en-US" smtClean="0"/>
-              <a:t>‹#›</a:t>
             </a:fld>
             <a:endParaRPr lang="en-US"/>
           </a:p>
         </p:txBody>
       </p:sp>
     </p:spTree>
-    <p:extLst>
-      <p:ext uri="{BB962C8B-B14F-4D97-AF65-F5344CB8AC3E}">
-        <p14:creationId xmlns:p14="http://schemas.microsoft.com/office/powerpoint/2010/main" val="3344280414"/>
-      </p:ext>
-    </p:extLst>
   </p:cSld>
   <p:clrMapOvr>
     <a:masterClrMapping/>
@@ -1409,6 +1384,7 @@
               <a:rPr lang="en-US" smtClean="0"/>
               <a:t>Click to edit Master text styles</a:t>
             </a:r>
+            <a:endParaRPr lang="en-US" smtClean="0"/>
           </a:p>
         </p:txBody>
       </p:sp>
@@ -1437,6 +1413,7 @@
               <a:rPr lang="en-US" smtClean="0"/>
               <a:t>Click to edit Master text styles</a:t>
             </a:r>
+            <a:endParaRPr lang="en-US" smtClean="0"/>
           </a:p>
           <a:p>
             <a:pPr lvl="1"/>
@@ -1444,6 +1421,7 @@
               <a:rPr lang="en-US" smtClean="0"/>
               <a:t>Second level</a:t>
             </a:r>
+            <a:endParaRPr lang="en-US" smtClean="0"/>
           </a:p>
           <a:p>
             <a:pPr lvl="2"/>
@@ -1451,6 +1429,7 @@
               <a:rPr lang="en-US" smtClean="0"/>
               <a:t>Third level</a:t>
             </a:r>
+            <a:endParaRPr lang="en-US" smtClean="0"/>
           </a:p>
           <a:p>
             <a:pPr lvl="3"/>
@@ -1458,6 +1437,7 @@
               <a:rPr lang="en-US" smtClean="0"/>
               <a:t>Fourth level</a:t>
             </a:r>
+            <a:endParaRPr lang="en-US" smtClean="0"/>
           </a:p>
           <a:p>
             <a:pPr lvl="4"/>
@@ -1531,6 +1511,7 @@
               <a:rPr lang="en-US" smtClean="0"/>
               <a:t>Click to edit Master text styles</a:t>
             </a:r>
+            <a:endParaRPr lang="en-US" smtClean="0"/>
           </a:p>
         </p:txBody>
       </p:sp>
@@ -1559,6 +1540,7 @@
               <a:rPr lang="en-US" smtClean="0"/>
               <a:t>Click to edit Master text styles</a:t>
             </a:r>
+            <a:endParaRPr lang="en-US" smtClean="0"/>
           </a:p>
           <a:p>
             <a:pPr lvl="1"/>
@@ -1566,6 +1548,7 @@
               <a:rPr lang="en-US" smtClean="0"/>
               <a:t>Second level</a:t>
             </a:r>
+            <a:endParaRPr lang="en-US" smtClean="0"/>
           </a:p>
           <a:p>
             <a:pPr lvl="2"/>
@@ -1573,6 +1556,7 @@
               <a:rPr lang="en-US" smtClean="0"/>
               <a:t>Third level</a:t>
             </a:r>
+            <a:endParaRPr lang="en-US" smtClean="0"/>
           </a:p>
           <a:p>
             <a:pPr lvl="3"/>
@@ -1580,6 +1564,7 @@
               <a:rPr lang="en-US" smtClean="0"/>
               <a:t>Fourth level</a:t>
             </a:r>
+            <a:endParaRPr lang="en-US" smtClean="0"/>
           </a:p>
           <a:p>
             <a:pPr lvl="4"/>
@@ -1608,7 +1593,6 @@
           <a:p>
             <a:fld id="{7BDD69B8-AA9B-4B38-8547-4FB5D336F50B}" type="datetimeFigureOut">
               <a:rPr lang="en-US" smtClean="0"/>
-              <a:t>7/21/2021</a:t>
             </a:fld>
             <a:endParaRPr lang="en-US"/>
           </a:p>
@@ -1650,18 +1634,12 @@
           <a:p>
             <a:fld id="{80603D6F-DFCA-4D91-A51C-800990C005DE}" type="slidenum">
               <a:rPr lang="en-US" smtClean="0"/>
-              <a:t>‹#›</a:t>
             </a:fld>
             <a:endParaRPr lang="en-US"/>
           </a:p>
         </p:txBody>
       </p:sp>
     </p:spTree>
-    <p:extLst>
-      <p:ext uri="{BB962C8B-B14F-4D97-AF65-F5344CB8AC3E}">
-        <p14:creationId xmlns:p14="http://schemas.microsoft.com/office/powerpoint/2010/main" val="2834794642"/>
-      </p:ext>
-    </p:extLst>
   </p:cSld>
   <p:clrMapOvr>
     <a:masterClrMapping/>
@@ -1726,7 +1704,6 @@
           <a:p>
             <a:fld id="{7BDD69B8-AA9B-4B38-8547-4FB5D336F50B}" type="datetimeFigureOut">
               <a:rPr lang="en-US" smtClean="0"/>
-              <a:t>7/21/2021</a:t>
             </a:fld>
             <a:endParaRPr lang="en-US"/>
           </a:p>
@@ -1768,18 +1745,12 @@
           <a:p>
             <a:fld id="{80603D6F-DFCA-4D91-A51C-800990C005DE}" type="slidenum">
               <a:rPr lang="en-US" smtClean="0"/>
-              <a:t>‹#›</a:t>
             </a:fld>
             <a:endParaRPr lang="en-US"/>
           </a:p>
         </p:txBody>
       </p:sp>
     </p:spTree>
-    <p:extLst>
-      <p:ext uri="{BB962C8B-B14F-4D97-AF65-F5344CB8AC3E}">
-        <p14:creationId xmlns:p14="http://schemas.microsoft.com/office/powerpoint/2010/main" val="1333311977"/>
-      </p:ext>
-    </p:extLst>
   </p:cSld>
   <p:clrMapOvr>
     <a:masterClrMapping/>
@@ -1821,7 +1792,6 @@
           <a:p>
             <a:fld id="{7BDD69B8-AA9B-4B38-8547-4FB5D336F50B}" type="datetimeFigureOut">
               <a:rPr lang="en-US" smtClean="0"/>
-              <a:t>7/21/2021</a:t>
             </a:fld>
             <a:endParaRPr lang="en-US"/>
           </a:p>
@@ -1863,18 +1833,12 @@
           <a:p>
             <a:fld id="{80603D6F-DFCA-4D91-A51C-800990C005DE}" type="slidenum">
               <a:rPr lang="en-US" smtClean="0"/>
-              <a:t>‹#›</a:t>
             </a:fld>
             <a:endParaRPr lang="en-US"/>
           </a:p>
         </p:txBody>
       </p:sp>
     </p:spTree>
-    <p:extLst>
-      <p:ext uri="{BB962C8B-B14F-4D97-AF65-F5344CB8AC3E}">
-        <p14:creationId xmlns:p14="http://schemas.microsoft.com/office/powerpoint/2010/main" val="1627172524"/>
-      </p:ext>
-    </p:extLst>
   </p:cSld>
   <p:clrMapOvr>
     <a:masterClrMapping/>
@@ -1984,6 +1948,7 @@
               <a:rPr lang="en-US" smtClean="0"/>
               <a:t>Click to edit Master text styles</a:t>
             </a:r>
+            <a:endParaRPr lang="en-US" smtClean="0"/>
           </a:p>
           <a:p>
             <a:pPr lvl="1"/>
@@ -1991,6 +1956,7 @@
               <a:rPr lang="en-US" smtClean="0"/>
               <a:t>Second level</a:t>
             </a:r>
+            <a:endParaRPr lang="en-US" smtClean="0"/>
           </a:p>
           <a:p>
             <a:pPr lvl="2"/>
@@ -1998,6 +1964,7 @@
               <a:rPr lang="en-US" smtClean="0"/>
               <a:t>Third level</a:t>
             </a:r>
+            <a:endParaRPr lang="en-US" smtClean="0"/>
           </a:p>
           <a:p>
             <a:pPr lvl="3"/>
@@ -2005,6 +1972,7 @@
               <a:rPr lang="en-US" smtClean="0"/>
               <a:t>Fourth level</a:t>
             </a:r>
+            <a:endParaRPr lang="en-US" smtClean="0"/>
           </a:p>
           <a:p>
             <a:pPr lvl="4"/>
@@ -2078,6 +2046,7 @@
               <a:rPr lang="en-US" smtClean="0"/>
               <a:t>Click to edit Master text styles</a:t>
             </a:r>
+            <a:endParaRPr lang="en-US" smtClean="0"/>
           </a:p>
         </p:txBody>
       </p:sp>
@@ -2098,7 +2067,6 @@
           <a:p>
             <a:fld id="{7BDD69B8-AA9B-4B38-8547-4FB5D336F50B}" type="datetimeFigureOut">
               <a:rPr lang="en-US" smtClean="0"/>
-              <a:t>7/21/2021</a:t>
             </a:fld>
             <a:endParaRPr lang="en-US"/>
           </a:p>
@@ -2140,18 +2108,12 @@
           <a:p>
             <a:fld id="{80603D6F-DFCA-4D91-A51C-800990C005DE}" type="slidenum">
               <a:rPr lang="en-US" smtClean="0"/>
-              <a:t>‹#›</a:t>
             </a:fld>
             <a:endParaRPr lang="en-US"/>
           </a:p>
         </p:txBody>
       </p:sp>
     </p:spTree>
-    <p:extLst>
-      <p:ext uri="{BB962C8B-B14F-4D97-AF65-F5344CB8AC3E}">
-        <p14:creationId xmlns:p14="http://schemas.microsoft.com/office/powerpoint/2010/main" val="2381723562"/>
-      </p:ext>
-    </p:extLst>
   </p:cSld>
   <p:clrMapOvr>
     <a:masterClrMapping/>
@@ -2331,6 +2293,7 @@
               <a:rPr lang="en-US" smtClean="0"/>
               <a:t>Click to edit Master text styles</a:t>
             </a:r>
+            <a:endParaRPr lang="en-US" smtClean="0"/>
           </a:p>
         </p:txBody>
       </p:sp>
@@ -2351,7 +2314,6 @@
           <a:p>
             <a:fld id="{7BDD69B8-AA9B-4B38-8547-4FB5D336F50B}" type="datetimeFigureOut">
               <a:rPr lang="en-US" smtClean="0"/>
-              <a:t>7/21/2021</a:t>
             </a:fld>
             <a:endParaRPr lang="en-US"/>
           </a:p>
@@ -2393,18 +2355,12 @@
           <a:p>
             <a:fld id="{80603D6F-DFCA-4D91-A51C-800990C005DE}" type="slidenum">
               <a:rPr lang="en-US" smtClean="0"/>
-              <a:t>‹#›</a:t>
             </a:fld>
             <a:endParaRPr lang="en-US"/>
           </a:p>
         </p:txBody>
       </p:sp>
     </p:spTree>
-    <p:extLst>
-      <p:ext uri="{BB962C8B-B14F-4D97-AF65-F5344CB8AC3E}">
-        <p14:creationId xmlns:p14="http://schemas.microsoft.com/office/powerpoint/2010/main" val="3749707950"/>
-      </p:ext>
-    </p:extLst>
   </p:cSld>
   <p:clrMapOvr>
     <a:masterClrMapping/>
@@ -2497,6 +2453,7 @@
               <a:rPr lang="en-US" smtClean="0"/>
               <a:t>Click to edit Master text styles</a:t>
             </a:r>
+            <a:endParaRPr lang="en-US" smtClean="0"/>
           </a:p>
           <a:p>
             <a:pPr lvl="1"/>
@@ -2504,6 +2461,7 @@
               <a:rPr lang="en-US" smtClean="0"/>
               <a:t>Second level</a:t>
             </a:r>
+            <a:endParaRPr lang="en-US" smtClean="0"/>
           </a:p>
           <a:p>
             <a:pPr lvl="2"/>
@@ -2511,6 +2469,7 @@
               <a:rPr lang="en-US" smtClean="0"/>
               <a:t>Third level</a:t>
             </a:r>
+            <a:endParaRPr lang="en-US" smtClean="0"/>
           </a:p>
           <a:p>
             <a:pPr lvl="3"/>
@@ -2518,6 +2477,7 @@
               <a:rPr lang="en-US" smtClean="0"/>
               <a:t>Fourth level</a:t>
             </a:r>
+            <a:endParaRPr lang="en-US" smtClean="0"/>
           </a:p>
           <a:p>
             <a:pPr lvl="4"/>
@@ -2564,7 +2524,6 @@
           <a:p>
             <a:fld id="{7BDD69B8-AA9B-4B38-8547-4FB5D336F50B}" type="datetimeFigureOut">
               <a:rPr lang="en-US" smtClean="0"/>
-              <a:t>7/21/2021</a:t>
             </a:fld>
             <a:endParaRPr lang="en-US"/>
           </a:p>
@@ -2642,18 +2601,12 @@
           <a:p>
             <a:fld id="{80603D6F-DFCA-4D91-A51C-800990C005DE}" type="slidenum">
               <a:rPr lang="en-US" smtClean="0"/>
-              <a:t>‹#›</a:t>
             </a:fld>
             <a:endParaRPr lang="en-US"/>
           </a:p>
         </p:txBody>
       </p:sp>
     </p:spTree>
-    <p:extLst>
-      <p:ext uri="{BB962C8B-B14F-4D97-AF65-F5344CB8AC3E}">
-        <p14:creationId xmlns:p14="http://schemas.microsoft.com/office/powerpoint/2010/main" val="1302401293"/>
-      </p:ext>
-    </p:extLst>
   </p:cSld>
   <p:clrMap bg1="lt1" tx1="dk1" bg2="lt2" tx2="dk2" accent1="accent1" accent2="accent2" accent3="accent3" accent4="accent4" accent5="accent5" accent6="accent6" hlink="hlink" folHlink="folHlink"/>
   <p:sldLayoutIdLst>
@@ -2978,6 +2931,36 @@
           <p:nvPr/>
         </p:nvPicPr>
         <p:blipFill>
+          <a:blip r:embed="rId1">
+            <a:extLst>
+              <a:ext uri="{28A0092B-C50C-407E-A947-70E740481C1C}">
+                <a14:useLocalDpi xmlns:a14="http://schemas.microsoft.com/office/drawing/2010/main" val="0"/>
+              </a:ext>
+            </a:extLst>
+          </a:blip>
+          <a:stretch>
+            <a:fillRect/>
+          </a:stretch>
+        </p:blipFill>
+        <p:spPr>
+          <a:xfrm>
+            <a:off x="9717311" y="463638"/>
+            <a:ext cx="2143125" cy="2143125"/>
+          </a:xfrm>
+          <a:prstGeom prst="rect">
+            <a:avLst/>
+          </a:prstGeom>
+        </p:spPr>
+      </p:pic>
+      <p:pic>
+        <p:nvPicPr>
+          <p:cNvPr id="5" name="Picture 4"/>
+          <p:cNvPicPr>
+            <a:picLocks noChangeAspect="1"/>
+          </p:cNvPicPr>
+          <p:nvPr/>
+        </p:nvPicPr>
+        <p:blipFill>
           <a:blip r:embed="rId2">
             <a:extLst>
               <a:ext uri="{28A0092B-C50C-407E-A947-70E740481C1C}">
@@ -2990,9 +2973,9 @@
           </a:stretch>
         </p:blipFill>
         <p:spPr>
-          <a:xfrm>
-            <a:off x="9717311" y="463638"/>
-            <a:ext cx="2143125" cy="2143125"/>
+          <a:xfrm rot="13766370">
+            <a:off x="6810776" y="4747898"/>
+            <a:ext cx="1581150" cy="2019300"/>
           </a:xfrm>
           <a:prstGeom prst="rect">
             <a:avLst/>
@@ -3001,14 +2984,14 @@
       </p:pic>
       <p:pic>
         <p:nvPicPr>
-          <p:cNvPr id="5" name="Picture 4"/>
+          <p:cNvPr id="6" name="Picture 5"/>
           <p:cNvPicPr>
             <a:picLocks noChangeAspect="1"/>
           </p:cNvPicPr>
           <p:nvPr/>
         </p:nvPicPr>
         <p:blipFill>
-          <a:blip r:embed="rId3">
+          <a:blip r:embed="rId3" cstate="print">
             <a:extLst>
               <a:ext uri="{28A0092B-C50C-407E-A947-70E740481C1C}">
                 <a14:useLocalDpi xmlns:a14="http://schemas.microsoft.com/office/drawing/2010/main" val="0"/>
@@ -3020,36 +3003,6 @@
           </a:stretch>
         </p:blipFill>
         <p:spPr>
-          <a:xfrm rot="13766370">
-            <a:off x="6810776" y="4747898"/>
-            <a:ext cx="1581150" cy="2019300"/>
-          </a:xfrm>
-          <a:prstGeom prst="rect">
-            <a:avLst/>
-          </a:prstGeom>
-        </p:spPr>
-      </p:pic>
-      <p:pic>
-        <p:nvPicPr>
-          <p:cNvPr id="6" name="Picture 5"/>
-          <p:cNvPicPr>
-            <a:picLocks noChangeAspect="1"/>
-          </p:cNvPicPr>
-          <p:nvPr/>
-        </p:nvPicPr>
-        <p:blipFill>
-          <a:blip r:embed="rId4" cstate="print">
-            <a:extLst>
-              <a:ext uri="{28A0092B-C50C-407E-A947-70E740481C1C}">
-                <a14:useLocalDpi xmlns:a14="http://schemas.microsoft.com/office/drawing/2010/main" val="0"/>
-              </a:ext>
-            </a:extLst>
-          </a:blip>
-          <a:stretch>
-            <a:fillRect/>
-          </a:stretch>
-        </p:blipFill>
-        <p:spPr>
           <a:xfrm>
             <a:off x="1155373" y="134972"/>
             <a:ext cx="3217649" cy="3217649"/>
@@ -3068,7 +3021,7 @@
           <p:nvPr/>
         </p:nvPicPr>
         <p:blipFill>
-          <a:blip r:embed="rId4" cstate="print">
+          <a:blip r:embed="rId3" cstate="print">
             <a:extLst>
               <a:ext uri="{28A0092B-C50C-407E-A947-70E740481C1C}">
                 <a14:useLocalDpi xmlns:a14="http://schemas.microsoft.com/office/drawing/2010/main" val="0"/>
@@ -3308,7 +3261,7 @@
           <p:nvPr/>
         </p:nvPicPr>
         <p:blipFill>
-          <a:blip r:embed="rId3">
+          <a:blip r:embed="rId2">
             <a:extLst>
               <a:ext uri="{28A0092B-C50C-407E-A947-70E740481C1C}">
                 <a14:useLocalDpi xmlns:a14="http://schemas.microsoft.com/office/drawing/2010/main" val="0"/>
@@ -3482,7 +3435,7 @@
           <p:nvPr/>
         </p:nvPicPr>
         <p:blipFill>
-          <a:blip r:embed="rId5" cstate="print">
+          <a:blip r:embed="rId4" cstate="print">
             <a:extLst>
               <a:ext uri="{28A0092B-C50C-407E-A947-70E740481C1C}">
                 <a14:useLocalDpi xmlns:a14="http://schemas.microsoft.com/office/drawing/2010/main" val="0"/>
@@ -3670,6 +3623,11 @@
               </a:rPr>
               <a:t>+</a:t>
             </a:r>
+            <a:endParaRPr lang="en-US" sz="6000" dirty="0">
+              <a:solidFill>
+                <a:srgbClr val="FF0000"/>
+              </a:solidFill>
+            </a:endParaRPr>
           </a:p>
         </p:txBody>
       </p:sp>
@@ -3733,6 +3691,11 @@
               </a:rPr>
               <a:t>+</a:t>
             </a:r>
+            <a:endParaRPr lang="en-US" sz="6000" dirty="0">
+              <a:solidFill>
+                <a:srgbClr val="FF0000"/>
+              </a:solidFill>
+            </a:endParaRPr>
           </a:p>
         </p:txBody>
       </p:sp>
@@ -4159,11 +4122,64 @@
         </p:txBody>
       </p:sp>
     </p:spTree>
-    <p:extLst>
-      <p:ext uri="{BB962C8B-B14F-4D97-AF65-F5344CB8AC3E}">
-        <p14:creationId xmlns:p14="http://schemas.microsoft.com/office/powerpoint/2010/main" val="1934276717"/>
-      </p:ext>
-    </p:extLst>
+  </p:cSld>
+  <p:clrMapOvr>
+    <a:masterClrMapping/>
+  </p:clrMapOvr>
+</p:sld>
+</file>
+
+<file path=ppt/slides/slide2.xml><?xml version="1.0" encoding="utf-8"?>
+<p:sld xmlns:a="http://schemas.openxmlformats.org/drawingml/2006/main" xmlns:r="http://schemas.openxmlformats.org/officeDocument/2006/relationships" xmlns:p="http://schemas.openxmlformats.org/presentationml/2006/main">
+  <p:cSld>
+    <p:spTree>
+      <p:nvGrpSpPr>
+        <p:cNvPr id="1" name=""/>
+        <p:cNvGrpSpPr/>
+        <p:nvPr/>
+      </p:nvGrpSpPr>
+      <p:grpSpPr/>
+      <p:sp>
+        <p:nvSpPr>
+          <p:cNvPr id="2" name="Title 1"/>
+          <p:cNvSpPr>
+            <a:spLocks noGrp="1"/>
+          </p:cNvSpPr>
+          <p:nvPr>
+            <p:ph type="title"/>
+          </p:nvPr>
+        </p:nvSpPr>
+        <p:spPr/>
+        <p:txBody>
+          <a:bodyPr/>
+          <a:p>
+            <a:r>
+              <a:rPr lang="en-US"/>
+              <a:t>Beetle Robot</a:t>
+            </a:r>
+            <a:endParaRPr lang="en-US"/>
+          </a:p>
+        </p:txBody>
+      </p:sp>
+      <p:sp>
+        <p:nvSpPr>
+          <p:cNvPr id="3" name="Content Placeholder 2"/>
+          <p:cNvSpPr>
+            <a:spLocks noGrp="1"/>
+          </p:cNvSpPr>
+          <p:nvPr>
+            <p:ph idx="1"/>
+          </p:nvPr>
+        </p:nvSpPr>
+        <p:spPr/>
+        <p:txBody>
+          <a:bodyPr/>
+          <a:p>
+            <a:endParaRPr lang="en-US"/>
+          </a:p>
+        </p:txBody>
+      </p:sp>
+    </p:spTree>
   </p:cSld>
   <p:clrMapOvr>
     <a:masterClrMapping/>
@@ -4214,7 +4230,7 @@
     </a:clrScheme>
     <a:fontScheme name="Office">
       <a:majorFont>
-        <a:latin typeface="Calibri Light" panose="020F0302020204030204"/>
+        <a:latin typeface="Calibri Light"/>
         <a:ea typeface=""/>
         <a:cs typeface=""/>
         <a:font script="Jpan" typeface="ＭＳ Ｐゴシック"/>
@@ -4249,7 +4265,7 @@
         <a:font script="Geor" typeface="Sylfaen"/>
       </a:majorFont>
       <a:minorFont>
-        <a:latin typeface="Calibri" panose="020F0502020204030204"/>
+        <a:latin typeface="Calibri"/>
         <a:ea typeface=""/>
         <a:cs typeface=""/>
         <a:font script="Jpan" typeface="ＭＳ Ｐゴシック"/>
@@ -4422,8 +4438,6 @@
       </a:bgFillStyleLst>
     </a:fmtScheme>
   </a:themeElements>
-  <a:objectDefaults/>
-  <a:extraClrSchemeLst/>
   <a:extLst>
     <a:ext uri="{05A4C25C-085E-4340-85A3-A5531E510DB2}">
       <thm15:themeFamily xmlns:thm15="http://schemas.microsoft.com/office/thememl/2012/main" name="Office Theme" id="{62F939B6-93AF-4DB8-9C6B-D6C7DFDC589F}" vid="{4A3C46E8-61CC-4603-A589-7422A47A8E4A}"/>

</xml_diff>